<commit_message>
Check the terminated process by EC2
</commit_message>
<xml_diff>
--- a/Ch02_AWS_DeployJavaWebApp.pptx
+++ b/Ch02_AWS_DeployJavaWebApp.pptx
@@ -5,7 +5,7 @@
     <p:sldMasterId id="2147483648" r:id="rId1"/>
   </p:sldMasterIdLst>
   <p:notesMasterIdLst>
-    <p:notesMasterId r:id="rId16"/>
+    <p:notesMasterId r:id="rId17"/>
   </p:notesMasterIdLst>
   <p:sldIdLst>
     <p:sldId id="256" r:id="rId2"/>
@@ -21,7 +21,8 @@
     <p:sldId id="272" r:id="rId12"/>
     <p:sldId id="273" r:id="rId13"/>
     <p:sldId id="275" r:id="rId14"/>
-    <p:sldId id="259" r:id="rId15"/>
+    <p:sldId id="276" r:id="rId15"/>
+    <p:sldId id="259" r:id="rId16"/>
   </p:sldIdLst>
   <p:sldSz cx="9144000" cy="6858000" type="screen4x3"/>
   <p:notesSz cx="6858000" cy="9144000"/>
@@ -4818,9 +4819,120 @@
         </p:nvSpPr>
         <p:spPr>
           <a:xfrm>
-            <a:off x="0" y="2130425"/>
-            <a:ext cx="9144000" cy="1470025"/>
-          </a:xfrm>
+            <a:off x="0" y="1"/>
+            <a:ext cx="9144000" cy="764704"/>
+          </a:xfrm>
+          <a:gradFill flip="none" rotWithShape="1">
+            <a:gsLst>
+              <a:gs pos="0">
+                <a:srgbClr val="C00000">
+                  <a:shade val="30000"/>
+                  <a:satMod val="115000"/>
+                </a:srgbClr>
+              </a:gs>
+              <a:gs pos="50000">
+                <a:srgbClr val="C00000">
+                  <a:shade val="67500"/>
+                  <a:satMod val="115000"/>
+                </a:srgbClr>
+              </a:gs>
+              <a:gs pos="100000">
+                <a:srgbClr val="C00000">
+                  <a:shade val="100000"/>
+                  <a:satMod val="115000"/>
+                </a:srgbClr>
+              </a:gs>
+            </a:gsLst>
+            <a:path path="circle">
+              <a:fillToRect t="100000" r="100000"/>
+            </a:path>
+            <a:tileRect l="-100000" b="-100000"/>
+          </a:gradFill>
+        </p:spPr>
+        <p:txBody>
+          <a:bodyPr>
+            <a:normAutofit/>
+          </a:bodyPr>
+          <a:lstStyle/>
+          <a:p>
+            <a:pPr algn="l"/>
+            <a:r>
+              <a:rPr lang="en-US" altLang="zh-TW" b="1" dirty="0">
+                <a:solidFill>
+                  <a:srgbClr val="FFFF00"/>
+                </a:solidFill>
+              </a:rPr>
+              <a:t>2 Deploy Web App</a:t>
+            </a:r>
+            <a:endParaRPr lang="zh-TW" altLang="en-US" b="1" dirty="0">
+              <a:solidFill>
+                <a:srgbClr val="FFFF00"/>
+              </a:solidFill>
+            </a:endParaRPr>
+          </a:p>
+        </p:txBody>
+      </p:sp>
+      <p:sp>
+        <p:nvSpPr>
+          <p:cNvPr id="3" name="副標題 2"/>
+          <p:cNvSpPr>
+            <a:spLocks noGrp="1"/>
+          </p:cNvSpPr>
+          <p:nvPr>
+            <p:ph type="subTitle" idx="1"/>
+          </p:nvPr>
+        </p:nvSpPr>
+        <p:spPr>
+          <a:xfrm>
+            <a:off x="467544" y="1268759"/>
+            <a:ext cx="8352928" cy="360040"/>
+          </a:xfrm>
+          <a:ln>
+            <a:solidFill>
+              <a:srgbClr val="C00000"/>
+            </a:solidFill>
+          </a:ln>
+        </p:spPr>
+        <p:txBody>
+          <a:bodyPr>
+            <a:noAutofit/>
+          </a:bodyPr>
+          <a:lstStyle/>
+          <a:p>
+            <a:pPr marL="465138" indent="-465138" algn="l">
+              <a:buClr>
+                <a:srgbClr val="0070C0"/>
+              </a:buClr>
+              <a:buFont typeface="Wingdings" pitchFamily="2" charset="2"/>
+              <a:buChar char="u"/>
+            </a:pPr>
+            <a:r>
+              <a:rPr lang="en-US" sz="1600" dirty="0">
+                <a:solidFill>
+                  <a:schemeClr val="tx1"/>
+                </a:solidFill>
+              </a:rPr>
+              <a:t>Go to EC2. Make sure the all the instances are terminated.</a:t>
+            </a:r>
+          </a:p>
+        </p:txBody>
+      </p:sp>
+      <p:sp>
+        <p:nvSpPr>
+          <p:cNvPr id="4" name="標題 1"/>
+          <p:cNvSpPr txBox="1">
+            <a:spLocks/>
+          </p:cNvSpPr>
+          <p:nvPr/>
+        </p:nvSpPr>
+        <p:spPr>
+          <a:xfrm>
+            <a:off x="-8722" y="759619"/>
+            <a:ext cx="9144000" cy="360040"/>
+          </a:xfrm>
+          <a:prstGeom prst="rect">
+            <a:avLst/>
+          </a:prstGeom>
           <a:gradFill flip="none" rotWithShape="1">
             <a:gsLst>
               <a:gs pos="0">
@@ -4849,6 +4961,182 @@
           </a:gradFill>
         </p:spPr>
         <p:txBody>
+          <a:bodyPr vert="horz" lIns="91440" tIns="45720" rIns="91440" bIns="45720" rtlCol="0" anchor="ctr">
+            <a:normAutofit/>
+          </a:bodyPr>
+          <a:lstStyle/>
+          <a:p>
+            <a:r>
+              <a:rPr lang="en-US" sz="1600" dirty="0">
+                <a:hlinkClick r:id="rId2"/>
+              </a:rPr>
+              <a:t>https://www.youtube.com/watch?v=jtyk_2_f3d0&amp;list=PLsyeobzWxl7rM-MltvxjUa-2LSgAhA11v&amp;index=2</a:t>
+            </a:r>
+            <a:endParaRPr lang="en-US" sz="1600" b="1" i="1" dirty="0"/>
+          </a:p>
+        </p:txBody>
+      </p:sp>
+      <p:sp>
+        <p:nvSpPr>
+          <p:cNvPr id="5" name="日期版面配置區 4"/>
+          <p:cNvSpPr>
+            <a:spLocks noGrp="1"/>
+          </p:cNvSpPr>
+          <p:nvPr>
+            <p:ph type="dt" sz="half" idx="10"/>
+          </p:nvPr>
+        </p:nvSpPr>
+        <p:spPr/>
+        <p:txBody>
+          <a:bodyPr/>
+          <a:lstStyle/>
+          <a:p>
+            <a:fld id="{A4F910E6-8D00-4BAF-8C48-9688E0B449D3}" type="datetime1">
+              <a:rPr lang="zh-TW" altLang="en-US" smtClean="0"/>
+              <a:pPr/>
+              <a:t>2019/5/13</a:t>
+            </a:fld>
+            <a:endParaRPr lang="zh-TW" altLang="en-US"/>
+          </a:p>
+        </p:txBody>
+      </p:sp>
+      <p:sp>
+        <p:nvSpPr>
+          <p:cNvPr id="6" name="投影片編號版面配置區 5"/>
+          <p:cNvSpPr>
+            <a:spLocks noGrp="1"/>
+          </p:cNvSpPr>
+          <p:nvPr>
+            <p:ph type="sldNum" sz="quarter" idx="12"/>
+          </p:nvPr>
+        </p:nvSpPr>
+        <p:spPr>
+          <a:xfrm>
+            <a:off x="6553200" y="6356349"/>
+            <a:ext cx="2133600" cy="365125"/>
+          </a:xfrm>
+        </p:spPr>
+        <p:txBody>
+          <a:bodyPr/>
+          <a:lstStyle/>
+          <a:p>
+            <a:fld id="{E4D7E63D-91F2-4366-A2C4-1B00C9E2590E}" type="slidenum">
+              <a:rPr lang="zh-TW" altLang="en-US" smtClean="0"/>
+              <a:pPr/>
+              <a:t>14</a:t>
+            </a:fld>
+            <a:endParaRPr lang="zh-TW" altLang="en-US"/>
+          </a:p>
+        </p:txBody>
+      </p:sp>
+      <p:pic>
+        <p:nvPicPr>
+          <p:cNvPr id="8" name="Picture 7">
+            <a:extLst>
+              <a:ext uri="{FF2B5EF4-FFF2-40B4-BE49-F238E27FC236}">
+                <a16:creationId xmlns:a16="http://schemas.microsoft.com/office/drawing/2014/main" id="{67565262-8A91-45AF-890B-9821515ED9D1}"/>
+              </a:ext>
+            </a:extLst>
+          </p:cNvPr>
+          <p:cNvPicPr>
+            <a:picLocks noChangeAspect="1"/>
+          </p:cNvPicPr>
+          <p:nvPr/>
+        </p:nvPicPr>
+        <p:blipFill>
+          <a:blip r:embed="rId3"/>
+          <a:stretch>
+            <a:fillRect/>
+          </a:stretch>
+        </p:blipFill>
+        <p:spPr>
+          <a:xfrm>
+            <a:off x="1132212" y="1777899"/>
+            <a:ext cx="6247084" cy="4578449"/>
+          </a:xfrm>
+          <a:prstGeom prst="rect">
+            <a:avLst/>
+          </a:prstGeom>
+          <a:ln>
+            <a:solidFill>
+              <a:srgbClr val="C00000"/>
+            </a:solidFill>
+          </a:ln>
+        </p:spPr>
+      </p:pic>
+    </p:spTree>
+    <p:extLst>
+      <p:ext uri="{BB962C8B-B14F-4D97-AF65-F5344CB8AC3E}">
+        <p14:creationId xmlns:p14="http://schemas.microsoft.com/office/powerpoint/2010/main" val="1509893772"/>
+      </p:ext>
+    </p:extLst>
+  </p:cSld>
+  <p:clrMapOvr>
+    <a:masterClrMapping/>
+  </p:clrMapOvr>
+</p:sld>
+</file>
+
+<file path=ppt/slides/slide15.xml><?xml version="1.0" encoding="utf-8"?>
+<p:sld xmlns:a="http://schemas.openxmlformats.org/drawingml/2006/main" xmlns:r="http://schemas.openxmlformats.org/officeDocument/2006/relationships" xmlns:p="http://schemas.openxmlformats.org/presentationml/2006/main">
+  <p:cSld>
+    <p:spTree>
+      <p:nvGrpSpPr>
+        <p:cNvPr id="1" name=""/>
+        <p:cNvGrpSpPr/>
+        <p:nvPr/>
+      </p:nvGrpSpPr>
+      <p:grpSpPr>
+        <a:xfrm>
+          <a:off x="0" y="0"/>
+          <a:ext cx="0" cy="0"/>
+          <a:chOff x="0" y="0"/>
+          <a:chExt cx="0" cy="0"/>
+        </a:xfrm>
+      </p:grpSpPr>
+      <p:sp>
+        <p:nvSpPr>
+          <p:cNvPr id="2" name="標題 1"/>
+          <p:cNvSpPr>
+            <a:spLocks noGrp="1"/>
+          </p:cNvSpPr>
+          <p:nvPr>
+            <p:ph type="ctrTitle"/>
+          </p:nvPr>
+        </p:nvSpPr>
+        <p:spPr>
+          <a:xfrm>
+            <a:off x="0" y="2130425"/>
+            <a:ext cx="9144000" cy="1470025"/>
+          </a:xfrm>
+          <a:gradFill flip="none" rotWithShape="1">
+            <a:gsLst>
+              <a:gs pos="0">
+                <a:srgbClr val="00B0F0">
+                  <a:shade val="30000"/>
+                  <a:satMod val="115000"/>
+                </a:srgbClr>
+              </a:gs>
+              <a:gs pos="50000">
+                <a:srgbClr val="00B0F0">
+                  <a:shade val="67500"/>
+                  <a:satMod val="115000"/>
+                </a:srgbClr>
+              </a:gs>
+              <a:gs pos="100000">
+                <a:srgbClr val="00B0F0">
+                  <a:shade val="100000"/>
+                  <a:satMod val="115000"/>
+                </a:srgbClr>
+              </a:gs>
+            </a:gsLst>
+            <a:path path="circle">
+              <a:fillToRect t="100000" r="100000"/>
+            </a:path>
+            <a:tileRect l="-100000" b="-100000"/>
+          </a:gradFill>
+        </p:spPr>
+        <p:txBody>
           <a:bodyPr>
             <a:normAutofit/>
           </a:bodyPr>
@@ -4912,7 +5200,7 @@
             <a:fld id="{E4D7E63D-91F2-4366-A2C4-1B00C9E2590E}" type="slidenum">
               <a:rPr lang="zh-TW" altLang="en-US" smtClean="0"/>
               <a:pPr/>
-              <a:t>14</a:t>
+              <a:t>15</a:t>
             </a:fld>
             <a:endParaRPr lang="zh-TW" altLang="en-US"/>
           </a:p>

</xml_diff>